<commit_message>
Added an extra space in Legal Aspects slide
</commit_message>
<xml_diff>
--- a/CSCI6708_Case_Study_Grp1_ppt_DRAFT.pptx
+++ b/CSCI6708_Case_Study_Grp1_ppt_DRAFT.pptx
@@ -1811,7 +1811,7 @@
           </a:ln>
           <a:extLst>
             <a:ext uri="{91240B29-F687-4f45-9708-019B960494DF}">
-              <a14:hiddenLine xmlns="" xmlns:a14="http://schemas.microsoft.com/office/drawing/2010/main" w="9525">
+              <a14:hiddenLine xmlns:a14="http://schemas.microsoft.com/office/drawing/2010/main" xmlns="" w="9525">
                 <a:solidFill>
                   <a:srgbClr val="000000"/>
                 </a:solidFill>
@@ -1866,7 +1866,7 @@
           </a:ln>
           <a:extLst>
             <a:ext uri="{91240B29-F687-4f45-9708-019B960494DF}">
-              <a14:hiddenLine xmlns="" xmlns:a14="http://schemas.microsoft.com/office/drawing/2010/main" w="9525">
+              <a14:hiddenLine xmlns:a14="http://schemas.microsoft.com/office/drawing/2010/main" xmlns="" w="9525">
                 <a:solidFill>
                   <a:srgbClr val="000000"/>
                 </a:solidFill>
@@ -8812,8 +8812,23 @@
             </a:pPr>
             <a:r>
               <a:rPr lang="en-US" sz="2800" i="1" dirty="0"/>
-              <a:t>Is the subject of efforts that are reasonable under the circumstances to maintain its secrecy</a:t>
-            </a:r>
+              <a:t>Is the subject of efforts that are reasonable under the circumstances to maintain </a:t>
+            </a:r>
+            <a:r>
+              <a:rPr lang="en-US" sz="2800" i="1"/>
+              <a:t>its secrecy</a:t>
+            </a:r>
+          </a:p>
+          <a:p>
+            <a:pPr marL="1564420" lvl="5" indent="0" algn="just">
+              <a:buNone/>
+              <a:defRPr sz="1800">
+                <a:solidFill>
+                  <a:srgbClr val="000000"/>
+                </a:solidFill>
+              </a:defRPr>
+            </a:pPr>
+            <a:endParaRPr lang="en-US" sz="2800" i="1" dirty="0"/>
           </a:p>
           <a:p>
             <a:pPr>

</xml_diff>

<commit_message>
Changed some words in Ethical Aspects slide
</commit_message>
<xml_diff>
--- a/CSCI6708_Case_Study_Grp1_ppt_DRAFT.pptx
+++ b/CSCI6708_Case_Study_Grp1_ppt_DRAFT.pptx
@@ -1811,7 +1811,7 @@
           </a:ln>
           <a:extLst>
             <a:ext uri="{91240B29-F687-4f45-9708-019B960494DF}">
-              <a14:hiddenLine xmlns:a14="http://schemas.microsoft.com/office/drawing/2010/main" xmlns="" w="9525">
+              <a14:hiddenLine xmlns="" xmlns:a14="http://schemas.microsoft.com/office/drawing/2010/main" w="9525">
                 <a:solidFill>
                   <a:srgbClr val="000000"/>
                 </a:solidFill>
@@ -1866,7 +1866,7 @@
           </a:ln>
           <a:extLst>
             <a:ext uri="{91240B29-F687-4f45-9708-019B960494DF}">
-              <a14:hiddenLine xmlns:a14="http://schemas.microsoft.com/office/drawing/2010/main" xmlns="" w="9525">
+              <a14:hiddenLine xmlns="" xmlns:a14="http://schemas.microsoft.com/office/drawing/2010/main" w="9525">
                 <a:solidFill>
                   <a:srgbClr val="000000"/>
                 </a:solidFill>
@@ -9033,8 +9033,21 @@
                   <a:schemeClr val="tx1"/>
                 </a:solidFill>
               </a:rPr>
-              <a:t>Prevention of financial loss</a:t>
-            </a:r>
+              <a:t>Prevention of </a:t>
+            </a:r>
+            <a:r>
+              <a:rPr lang="en-US" sz="4000" cap="none">
+                <a:solidFill>
+                  <a:schemeClr val="tx1"/>
+                </a:solidFill>
+              </a:rPr>
+              <a:t>financial losses</a:t>
+            </a:r>
+            <a:endParaRPr lang="en-US" sz="4000" cap="none" dirty="0">
+              <a:solidFill>
+                <a:schemeClr val="tx1"/>
+              </a:solidFill>
+            </a:endParaRPr>
           </a:p>
           <a:p>
             <a:pPr lvl="0">

</xml_diff>

<commit_message>
Auto stash before merge of "master" and "NetworkSecurity/master"
</commit_message>
<xml_diff>
--- a/CSCI6708_Case_Study_Grp1_ppt_DRAFT.pptx
+++ b/CSCI6708_Case_Study_Grp1_ppt_DRAFT.pptx
@@ -179,7 +179,7 @@
           <a:p>
             <a:fld id="{8AA07402-A2D1-224B-9540-AD2693A5FEE9}" type="datetimeFigureOut">
               <a:rPr lang="en-US" smtClean="0"/>
-              <a:t>4/6/2018</a:t>
+              <a:t>4/7/18</a:t>
             </a:fld>
             <a:endParaRPr lang="en-US"/>
           </a:p>
@@ -462,7 +462,7 @@
           <a:p>
             <a:fld id="{62DCA116-7934-5E4A-9F70-5101DDBE45C4}" type="datetimeFigureOut">
               <a:rPr lang="en-US" smtClean="0"/>
-              <a:t>4/6/2018</a:t>
+              <a:t>4/7/18</a:t>
             </a:fld>
             <a:endParaRPr lang="en-US"/>
           </a:p>
@@ -1710,7 +1710,7 @@
           <a:p>
             <a:fld id="{AF9D92C3-6CD5-494E-AAA0-12835F54A429}" type="datetimeFigureOut">
               <a:rPr lang="en-US" smtClean="0"/>
-              <a:t>4/6/2018</a:t>
+              <a:t>4/7/18</a:t>
             </a:fld>
             <a:endParaRPr lang="en-US"/>
           </a:p>
@@ -1811,7 +1811,7 @@
           </a:ln>
           <a:extLst>
             <a:ext uri="{91240B29-F687-4f45-9708-019B960494DF}">
-              <a14:hiddenLine xmlns="" xmlns:a14="http://schemas.microsoft.com/office/drawing/2010/main" w="9525">
+              <a14:hiddenLine xmlns:a14="http://schemas.microsoft.com/office/drawing/2010/main" xmlns="" w="9525">
                 <a:solidFill>
                   <a:srgbClr val="000000"/>
                 </a:solidFill>
@@ -1866,7 +1866,7 @@
           </a:ln>
           <a:extLst>
             <a:ext uri="{91240B29-F687-4f45-9708-019B960494DF}">
-              <a14:hiddenLine xmlns="" xmlns:a14="http://schemas.microsoft.com/office/drawing/2010/main" w="9525">
+              <a14:hiddenLine xmlns:a14="http://schemas.microsoft.com/office/drawing/2010/main" xmlns="" w="9525">
                 <a:solidFill>
                   <a:srgbClr val="000000"/>
                 </a:solidFill>
@@ -2116,7 +2116,7 @@
           <a:p>
             <a:fld id="{AF9D92C3-6CD5-494E-AAA0-12835F54A429}" type="datetimeFigureOut">
               <a:rPr lang="en-US" smtClean="0"/>
-              <a:t>4/6/2018</a:t>
+              <a:t>4/7/18</a:t>
             </a:fld>
             <a:endParaRPr lang="en-US"/>
           </a:p>
@@ -2359,7 +2359,7 @@
           <a:p>
             <a:fld id="{AF9D92C3-6CD5-494E-AAA0-12835F54A429}" type="datetimeFigureOut">
               <a:rPr lang="en-US" smtClean="0"/>
-              <a:t>4/6/2018</a:t>
+              <a:t>4/7/18</a:t>
             </a:fld>
             <a:endParaRPr lang="en-US"/>
           </a:p>
@@ -2894,7 +2894,7 @@
           <a:p>
             <a:fld id="{AF9D92C3-6CD5-494E-AAA0-12835F54A429}" type="datetimeFigureOut">
               <a:rPr lang="en-US" smtClean="0"/>
-              <a:t>4/6/2018</a:t>
+              <a:t>4/7/18</a:t>
             </a:fld>
             <a:endParaRPr lang="en-US"/>
           </a:p>
@@ -3137,7 +3137,7 @@
           <a:p>
             <a:fld id="{AF9D92C3-6CD5-494E-AAA0-12835F54A429}" type="datetimeFigureOut">
               <a:rPr lang="en-US" smtClean="0"/>
-              <a:t>4/6/2018</a:t>
+              <a:t>4/7/18</a:t>
             </a:fld>
             <a:endParaRPr lang="en-US"/>
           </a:p>
@@ -3664,7 +3664,7 @@
           <a:p>
             <a:fld id="{AF9D92C3-6CD5-494E-AAA0-12835F54A429}" type="datetimeFigureOut">
               <a:rPr lang="en-US" smtClean="0"/>
-              <a:t>4/6/2018</a:t>
+              <a:t>4/7/18</a:t>
             </a:fld>
             <a:endParaRPr lang="en-US"/>
           </a:p>
@@ -3956,7 +3956,7 @@
           <a:p>
             <a:fld id="{AF9D92C3-6CD5-494E-AAA0-12835F54A429}" type="datetimeFigureOut">
               <a:rPr lang="en-US" smtClean="0"/>
-              <a:t>4/6/2018</a:t>
+              <a:t>4/7/18</a:t>
             </a:fld>
             <a:endParaRPr lang="en-US"/>
           </a:p>
@@ -4125,7 +4125,7 @@
           <a:p>
             <a:fld id="{AF9D92C3-6CD5-494E-AAA0-12835F54A429}" type="datetimeFigureOut">
               <a:rPr lang="en-US" smtClean="0"/>
-              <a:t>4/6/2018</a:t>
+              <a:t>4/7/18</a:t>
             </a:fld>
             <a:endParaRPr lang="en-US"/>
           </a:p>
@@ -4300,7 +4300,7 @@
           <a:p>
             <a:fld id="{AF9D92C3-6CD5-494E-AAA0-12835F54A429}" type="datetimeFigureOut">
               <a:rPr lang="en-US" smtClean="0"/>
-              <a:t>4/6/2018</a:t>
+              <a:t>4/7/18</a:t>
             </a:fld>
             <a:endParaRPr lang="en-US"/>
           </a:p>
@@ -4731,7 +4731,7 @@
           <a:p>
             <a:fld id="{AF9D92C3-6CD5-494E-AAA0-12835F54A429}" type="datetimeFigureOut">
               <a:rPr lang="en-US" smtClean="0"/>
-              <a:t>4/6/2018</a:t>
+              <a:t>4/7/18</a:t>
             </a:fld>
             <a:endParaRPr lang="en-US"/>
           </a:p>
@@ -4982,7 +4982,7 @@
           <a:p>
             <a:fld id="{AF9D92C3-6CD5-494E-AAA0-12835F54A429}" type="datetimeFigureOut">
               <a:rPr lang="en-US" smtClean="0"/>
-              <a:t>4/6/2018</a:t>
+              <a:t>4/7/18</a:t>
             </a:fld>
             <a:endParaRPr lang="en-US"/>
           </a:p>
@@ -5279,7 +5279,7 @@
           <a:p>
             <a:fld id="{AF9D92C3-6CD5-494E-AAA0-12835F54A429}" type="datetimeFigureOut">
               <a:rPr lang="en-US" smtClean="0"/>
-              <a:t>4/6/2018</a:t>
+              <a:t>4/7/18</a:t>
             </a:fld>
             <a:endParaRPr lang="en-US"/>
           </a:p>
@@ -5716,7 +5716,7 @@
           <a:p>
             <a:fld id="{AF9D92C3-6CD5-494E-AAA0-12835F54A429}" type="datetimeFigureOut">
               <a:rPr lang="en-US" smtClean="0"/>
-              <a:t>4/6/2018</a:t>
+              <a:t>4/7/18</a:t>
             </a:fld>
             <a:endParaRPr lang="en-US"/>
           </a:p>
@@ -5829,7 +5829,7 @@
           <a:p>
             <a:fld id="{AF9D92C3-6CD5-494E-AAA0-12835F54A429}" type="datetimeFigureOut">
               <a:rPr lang="en-US" smtClean="0"/>
-              <a:t>4/6/2018</a:t>
+              <a:t>4/7/18</a:t>
             </a:fld>
             <a:endParaRPr lang="en-US"/>
           </a:p>
@@ -5919,7 +5919,7 @@
           <a:p>
             <a:fld id="{AF9D92C3-6CD5-494E-AAA0-12835F54A429}" type="datetimeFigureOut">
               <a:rPr lang="en-US" smtClean="0"/>
-              <a:t>4/6/2018</a:t>
+              <a:t>4/7/18</a:t>
             </a:fld>
             <a:endParaRPr lang="en-US"/>
           </a:p>
@@ -6197,7 +6197,7 @@
           <a:p>
             <a:fld id="{AF9D92C3-6CD5-494E-AAA0-12835F54A429}" type="datetimeFigureOut">
               <a:rPr lang="en-US" smtClean="0"/>
-              <a:t>4/6/2018</a:t>
+              <a:t>4/7/18</a:t>
             </a:fld>
             <a:endParaRPr lang="en-US"/>
           </a:p>
@@ -6483,7 +6483,7 @@
           <a:p>
             <a:fld id="{AF9D92C3-6CD5-494E-AAA0-12835F54A429}" type="datetimeFigureOut">
               <a:rPr lang="en-US" smtClean="0"/>
-              <a:t>4/6/2018</a:t>
+              <a:t>4/7/18</a:t>
             </a:fld>
             <a:endParaRPr lang="en-US"/>
           </a:p>
@@ -7002,7 +7002,7 @@
           <a:p>
             <a:fld id="{AF9D92C3-6CD5-494E-AAA0-12835F54A429}" type="datetimeFigureOut">
               <a:rPr lang="en-US" smtClean="0"/>
-              <a:t>4/6/2018</a:t>
+              <a:t>4/7/18</a:t>
             </a:fld>
             <a:endParaRPr lang="en-US"/>
           </a:p>
@@ -7997,6 +7997,13 @@
     <a:masterClrMapping/>
   </p:clrMapOvr>
   <p:transition spd="med"/>
+  <p:timing>
+    <p:tnLst>
+      <p:par>
+        <p:cTn id="1" dur="indefinite" restart="never" nodeType="tmRoot"/>
+      </p:par>
+    </p:tnLst>
+  </p:timing>
 </p:sld>
 </file>
 
@@ -8068,7 +8075,7 @@
           <p:cNvPr id="4" name="Shape 52">
             <a:extLst>
               <a:ext uri="{FF2B5EF4-FFF2-40B4-BE49-F238E27FC236}">
-                <a16:creationId xmlns:a16="http://schemas.microsoft.com/office/drawing/2014/main" id="{B8774B46-179D-4604-9210-CEA98185A51C}"/>
+                <a16:creationId xmlns:a16="http://schemas.microsoft.com/office/drawing/2014/main" xmlns="" id="{B8774B46-179D-4604-9210-CEA98185A51C}"/>
               </a:ext>
             </a:extLst>
           </p:cNvPr>
@@ -8237,6 +8244,13 @@
     <a:masterClrMapping/>
   </p:clrMapOvr>
   <p:transition spd="med"/>
+  <p:timing>
+    <p:tnLst>
+      <p:par>
+        <p:cTn id="1" dur="indefinite" restart="never" nodeType="tmRoot"/>
+      </p:par>
+    </p:tnLst>
+  </p:timing>
 </p:sld>
 </file>
 
@@ -8517,6 +8531,13 @@
     <a:masterClrMapping/>
   </p:clrMapOvr>
   <p:transition spd="med"/>
+  <p:timing>
+    <p:tnLst>
+      <p:par>
+        <p:cTn id="1" dur="indefinite" restart="never" nodeType="tmRoot"/>
+      </p:par>
+    </p:tnLst>
+  </p:timing>
 </p:sld>
 </file>
 
@@ -8597,53 +8618,198 @@
         </p:nvSpPr>
         <p:spPr>
           <a:xfrm>
-            <a:off x="2675466" y="3204404"/>
-            <a:ext cx="11684000" cy="1862666"/>
+            <a:off x="1828800" y="3228975"/>
+            <a:ext cx="10329334" cy="7316559"/>
           </a:xfrm>
         </p:spPr>
         <p:txBody>
           <a:bodyPr>
-            <a:normAutofit fontScale="92500" lnSpcReduction="10000"/>
+            <a:noAutofit/>
           </a:bodyPr>
           <a:lstStyle/>
+          <a:p>
+            <a:pPr lvl="0"/>
+            <a:endParaRPr lang="en-CA" sz="3600" dirty="0">
+              <a:solidFill>
+                <a:schemeClr val="tx1"/>
+              </a:solidFill>
+            </a:endParaRPr>
+          </a:p>
+          <a:p>
+            <a:pPr marL="514350" lvl="0" indent="-514350">
+              <a:buFont typeface="Arial" charset="0"/>
+              <a:buChar char="•"/>
+            </a:pPr>
+            <a:r>
+              <a:rPr lang="en-US" sz="3200" cap="none" dirty="0" smtClean="0">
+                <a:solidFill>
+                  <a:schemeClr val="tx1"/>
+                </a:solidFill>
+              </a:rPr>
+              <a:t>Vulnerabilities </a:t>
+            </a:r>
+          </a:p>
+          <a:p>
+            <a:pPr marL="514350" lvl="4" indent="-514350">
+              <a:buFont typeface="Arial" charset="0"/>
+              <a:buChar char="•"/>
+            </a:pPr>
+            <a:r>
+              <a:rPr lang="en-US" sz="3200" cap="none" dirty="0">
+                <a:solidFill>
+                  <a:schemeClr val="tx1"/>
+                </a:solidFill>
+              </a:rPr>
+              <a:t>Routers and switches are just hardware </a:t>
+            </a:r>
+          </a:p>
+          <a:p>
+            <a:pPr marL="514350" lvl="2" indent="-514350">
+              <a:buFont typeface="Arial" charset="0"/>
+              <a:buChar char="•"/>
+            </a:pPr>
+            <a:r>
+              <a:rPr lang="en-US" sz="3200" cap="none" dirty="0" smtClean="0">
+                <a:solidFill>
+                  <a:schemeClr val="tx1"/>
+                </a:solidFill>
+              </a:rPr>
+              <a:t>It </a:t>
+            </a:r>
+            <a:r>
+              <a:rPr lang="en-US" sz="3200" cap="none" dirty="0">
+                <a:solidFill>
+                  <a:schemeClr val="tx1"/>
+                </a:solidFill>
+              </a:rPr>
+              <a:t>is not possible to exploit buffers on IOS Cisco IOS exploitation techniques </a:t>
+            </a:r>
+            <a:r>
+              <a:rPr lang="en-US" sz="3200" cap="none" dirty="0" smtClean="0">
+                <a:solidFill>
+                  <a:schemeClr val="tx1"/>
+                </a:solidFill>
+              </a:rPr>
+              <a:t>used</a:t>
+            </a:r>
+          </a:p>
+          <a:p>
+            <a:pPr marL="457200" lvl="4" indent="-457200">
+              <a:buFont typeface="Arial" charset="0"/>
+              <a:buChar char="•"/>
+            </a:pPr>
+            <a:r>
+              <a:rPr lang="en-US" sz="3200" cap="none" dirty="0">
+                <a:solidFill>
+                  <a:schemeClr val="tx1"/>
+                </a:solidFill>
+              </a:rPr>
+              <a:t>Stack Overflows </a:t>
+            </a:r>
+          </a:p>
+          <a:p>
+            <a:pPr marL="457200" lvl="4" indent="-457200">
+              <a:buFont typeface="Arial" charset="0"/>
+              <a:buChar char="•"/>
+            </a:pPr>
+            <a:r>
+              <a:rPr lang="en-US" sz="3200" cap="none" dirty="0">
+                <a:solidFill>
+                  <a:schemeClr val="tx1"/>
+                </a:solidFill>
+              </a:rPr>
+              <a:t>Heap </a:t>
+            </a:r>
+            <a:r>
+              <a:rPr lang="en-US" sz="3200" cap="none" dirty="0" smtClean="0">
+                <a:solidFill>
+                  <a:schemeClr val="tx1"/>
+                </a:solidFill>
+              </a:rPr>
+              <a:t>Overflows</a:t>
+            </a:r>
+          </a:p>
+          <a:p>
+            <a:pPr marL="514350" lvl="0" indent="-514350">
+              <a:buFont typeface="Arial" charset="0"/>
+              <a:buChar char="•"/>
+            </a:pPr>
+            <a:r>
+              <a:rPr lang="en-US" sz="3200" cap="none" dirty="0" smtClean="0">
+                <a:solidFill>
+                  <a:schemeClr val="tx1"/>
+                </a:solidFill>
+              </a:rPr>
+              <a:t>Severity </a:t>
+            </a:r>
+            <a:endParaRPr lang="en-US" sz="3200" cap="none" dirty="0">
+              <a:solidFill>
+                <a:schemeClr val="tx1"/>
+              </a:solidFill>
+            </a:endParaRPr>
+          </a:p>
+          <a:p>
+            <a:pPr marL="514350" lvl="0" indent="-514350">
+              <a:buFont typeface="+mj-lt"/>
+              <a:buAutoNum type="arabicPeriod"/>
+            </a:pPr>
+            <a:endParaRPr lang="en-US" sz="3200" cap="none" dirty="0">
+              <a:solidFill>
+                <a:schemeClr val="tx1"/>
+              </a:solidFill>
+            </a:endParaRPr>
+          </a:p>
+          <a:p>
+            <a:pPr marL="514350" indent="-514350">
+              <a:buFont typeface="+mj-lt"/>
+              <a:buAutoNum type="arabicPeriod"/>
+              <a:defRPr sz="1800">
+                <a:solidFill>
+                  <a:srgbClr val="000000"/>
+                </a:solidFill>
+              </a:defRPr>
+            </a:pPr>
+            <a:endParaRPr lang="en-US" sz="3200" cap="none" dirty="0" smtClean="0">
+              <a:solidFill>
+                <a:schemeClr val="tx1"/>
+              </a:solidFill>
+            </a:endParaRPr>
+          </a:p>
+          <a:p>
+            <a:pPr marL="457200" lvl="4" indent="-457200">
+              <a:buFont typeface="Arial" charset="0"/>
+              <a:buChar char="•"/>
+            </a:pPr>
+            <a:endParaRPr lang="en-US" sz="3200" cap="none" dirty="0">
+              <a:solidFill>
+                <a:schemeClr val="tx1"/>
+              </a:solidFill>
+            </a:endParaRPr>
+          </a:p>
+          <a:p>
+            <a:pPr>
+              <a:defRPr sz="1800">
+                <a:solidFill>
+                  <a:srgbClr val="000000"/>
+                </a:solidFill>
+              </a:defRPr>
+            </a:pPr>
+            <a:endParaRPr lang="en-CA" sz="3600" dirty="0">
+              <a:solidFill>
+                <a:schemeClr val="tx1"/>
+              </a:solidFill>
+            </a:endParaRPr>
+          </a:p>
           <a:p>
             <a:pPr marL="342900" indent="-342900">
               <a:buFont typeface="Arial" charset="0"/>
               <a:buChar char="•"/>
             </a:pPr>
-            <a:r>
-              <a:rPr lang="en-US" sz="4000" cap="none" dirty="0">
-                <a:solidFill>
-                  <a:schemeClr val="tx1"/>
-                </a:solidFill>
-              </a:rPr>
-              <a:t>Severity </a:t>
-            </a:r>
-          </a:p>
-          <a:p>
-            <a:pPr marL="342900" indent="-342900">
-              <a:buFont typeface="Arial" charset="0"/>
-              <a:buChar char="•"/>
-            </a:pPr>
-            <a:endParaRPr lang="en-US" sz="4000" cap="none" dirty="0">
+            <a:endParaRPr lang="en-US" sz="3390" cap="none" dirty="0">
               <a:solidFill>
                 <a:schemeClr val="tx1"/>
               </a:solidFill>
             </a:endParaRPr>
-          </a:p>
-          <a:p>
-            <a:pPr marL="342900" indent="-342900">
-              <a:buFont typeface="Arial" charset="0"/>
-              <a:buChar char="•"/>
-            </a:pPr>
-            <a:r>
-              <a:rPr lang="en-US" sz="4000" cap="none" dirty="0">
-                <a:solidFill>
-                  <a:schemeClr val="tx1"/>
-                </a:solidFill>
-              </a:rPr>
-              <a:t>Devices affected</a:t>
-            </a:r>
           </a:p>
         </p:txBody>
       </p:sp>
@@ -8653,6 +8819,13 @@
     <a:masterClrMapping/>
   </p:clrMapOvr>
   <p:transition spd="med"/>
+  <p:timing>
+    <p:tnLst>
+      <p:par>
+        <p:cTn id="1" dur="indefinite" restart="never" nodeType="tmRoot"/>
+      </p:par>
+    </p:tnLst>
+  </p:timing>
 </p:sld>
 </file>
 
@@ -8773,16 +8946,40 @@
               <a:t> 1. </a:t>
             </a:r>
             <a:r>
-              <a:rPr lang="en-CA" sz="3200" dirty="0">
+              <a:rPr lang="en-CA" sz="3200" dirty="0" smtClean="0">
                 <a:solidFill>
                   <a:schemeClr val="tx1"/>
                 </a:solidFill>
               </a:rPr>
-              <a:t>Trade Secrets</a:t>
-            </a:r>
+              <a:t>M</a:t>
+            </a:r>
+            <a:r>
+              <a:rPr lang="en-CA" sz="3200" dirty="0" smtClean="0">
+                <a:solidFill>
+                  <a:schemeClr val="tx1"/>
+                </a:solidFill>
+              </a:rPr>
+              <a:t>isappropriation of Trade Secrets</a:t>
+            </a:r>
+            <a:r>
+              <a:rPr lang="en-CA" sz="3200" baseline="30000" dirty="0" smtClean="0">
+                <a:solidFill>
+                  <a:schemeClr val="tx1"/>
+                </a:solidFill>
+              </a:rPr>
+              <a:t>[2]</a:t>
+            </a:r>
+            <a:endParaRPr lang="en-CA" sz="3200" dirty="0">
+              <a:solidFill>
+                <a:schemeClr val="tx1"/>
+              </a:solidFill>
+            </a:endParaRPr>
           </a:p>
           <a:p>
             <a:pPr marL="2307370" lvl="5" indent="-742950" algn="just">
+              <a:buClr>
+                <a:schemeClr val="tx1"/>
+              </a:buClr>
               <a:buFont typeface="Arial" panose="020B0604020202020204" pitchFamily="34" charset="0"/>
               <a:buChar char="•"/>
               <a:defRPr sz="1800">
@@ -8802,6 +8999,9 @@
           </a:p>
           <a:p>
             <a:pPr marL="2307370" lvl="5" indent="-742950" algn="just">
+              <a:buClr>
+                <a:schemeClr val="tx1"/>
+              </a:buClr>
               <a:buFont typeface="Arial" panose="020B0604020202020204" pitchFamily="34" charset="0"/>
               <a:buChar char="•"/>
               <a:defRPr sz="1800">
@@ -8812,11 +9012,7 @@
             </a:pPr>
             <a:r>
               <a:rPr lang="en-US" sz="2800" i="1" dirty="0"/>
-              <a:t>Is the subject of efforts that are reasonable under the circumstances to maintain </a:t>
-            </a:r>
-            <a:r>
-              <a:rPr lang="en-US" sz="2800" i="1"/>
-              <a:t>its secrecy</a:t>
+              <a:t>Is the subject of efforts that are reasonable under the circumstances to maintain its secrecy</a:t>
             </a:r>
           </a:p>
           <a:p>
@@ -8850,7 +9046,19 @@
               <a:rPr lang="en-US" sz="3200" dirty="0">
                 <a:latin typeface="Corbel" panose="020B0503020204020204" pitchFamily="34" charset="0"/>
               </a:rPr>
-              <a:t>Cisco thought decompiling was improper</a:t>
+              <a:t>Cisco thought decompiling was </a:t>
+            </a:r>
+            <a:r>
+              <a:rPr lang="en-US" sz="3200" dirty="0" smtClean="0">
+                <a:latin typeface="Corbel" panose="020B0503020204020204" pitchFamily="34" charset="0"/>
+              </a:rPr>
+              <a:t>improper</a:t>
+            </a:r>
+            <a:r>
+              <a:rPr lang="en-US" sz="3200" baseline="30000" dirty="0" smtClean="0">
+                <a:latin typeface="Corbel" panose="020B0503020204020204" pitchFamily="34" charset="0"/>
+              </a:rPr>
+              <a:t>[2]</a:t>
             </a:r>
             <a:endParaRPr lang="en-US" sz="3200" dirty="0">
               <a:solidFill>
@@ -8881,6 +9089,13 @@
     <a:masterClrMapping/>
   </p:clrMapOvr>
   <p:transition spd="med"/>
+  <p:timing>
+    <p:tnLst>
+      <p:par>
+        <p:cTn id="1" dur="indefinite" restart="never" nodeType="tmRoot"/>
+      </p:par>
+    </p:tnLst>
+  </p:timing>
 </p:sld>
 </file>
 
@@ -9106,6 +9321,13 @@
     <a:masterClrMapping/>
   </p:clrMapOvr>
   <p:transition spd="med"/>
+  <p:timing>
+    <p:tnLst>
+      <p:par>
+        <p:cTn id="1" dur="indefinite" restart="never" nodeType="tmRoot"/>
+      </p:par>
+    </p:tnLst>
+  </p:timing>
 </p:sld>
 </file>
 
@@ -9198,7 +9420,7 @@
           <p:cNvPr id="3" name="Picture 2">
             <a:extLst>
               <a:ext uri="{FF2B5EF4-FFF2-40B4-BE49-F238E27FC236}">
-                <a16:creationId xmlns:a16="http://schemas.microsoft.com/office/drawing/2014/main" id="{3DBCE471-A0CA-4A7A-B4EF-46DCD244F864}"/>
+                <a16:creationId xmlns:a16="http://schemas.microsoft.com/office/drawing/2014/main" xmlns="" id="{3DBCE471-A0CA-4A7A-B4EF-46DCD244F864}"/>
               </a:ext>
             </a:extLst>
           </p:cNvPr>
@@ -9234,7 +9456,7 @@
           <p:cNvPr id="4" name="TextBox 3">
             <a:extLst>
               <a:ext uri="{FF2B5EF4-FFF2-40B4-BE49-F238E27FC236}">
-                <a16:creationId xmlns:a16="http://schemas.microsoft.com/office/drawing/2014/main" id="{259941C7-C50F-4D2C-BF65-D4BAF0C6E368}"/>
+                <a16:creationId xmlns:a16="http://schemas.microsoft.com/office/drawing/2014/main" xmlns="" id="{259941C7-C50F-4D2C-BF65-D4BAF0C6E368}"/>
               </a:ext>
             </a:extLst>
           </p:cNvPr>
@@ -9274,6 +9496,13 @@
     <a:masterClrMapping/>
   </p:clrMapOvr>
   <p:transition spd="med"/>
+  <p:timing>
+    <p:tnLst>
+      <p:par>
+        <p:cTn id="1" dur="indefinite" restart="never" nodeType="tmRoot"/>
+      </p:par>
+    </p:tnLst>
+  </p:timing>
 </p:sld>
 </file>
 
@@ -9357,8 +9586,8 @@
         </p:nvSpPr>
         <p:spPr>
           <a:xfrm>
-            <a:off x="1190487" y="2849217"/>
-            <a:ext cx="11684000" cy="1403076"/>
+            <a:off x="1190486" y="2677885"/>
+            <a:ext cx="11684001" cy="5334000"/>
           </a:xfrm>
           <a:prstGeom prst="rect">
             <a:avLst/>
@@ -9374,13 +9603,328 @@
               <a:buAutoNum type="arabicPeriod"/>
             </a:pPr>
             <a:r>
-              <a:rPr lang="en-US" cap="none" dirty="0">
-                <a:solidFill>
-                  <a:schemeClr val="tx1"/>
-                </a:solidFill>
+              <a:rPr lang="en-US" sz="2000" cap="none" dirty="0">
+                <a:solidFill>
+                  <a:schemeClr val="tx1"/>
+                </a:solidFill>
+                <a:hlinkClick r:id="rId2"/>
               </a:rPr>
-              <a:t>http://www.thebluediamondgallery.com/handwriting/q/question.html</a:t>
-            </a:r>
+              <a:t>http://</a:t>
+            </a:r>
+            <a:r>
+              <a:rPr lang="en-US" sz="2000" cap="none" dirty="0" smtClean="0">
+                <a:solidFill>
+                  <a:schemeClr val="tx1"/>
+                </a:solidFill>
+                <a:hlinkClick r:id="rId2"/>
+              </a:rPr>
+              <a:t>www.thebluediamondgallery.com/handwriting/q/question.html</a:t>
+            </a:r>
+            <a:endParaRPr lang="en-US" sz="2000" cap="none" dirty="0" smtClean="0">
+              <a:solidFill>
+                <a:schemeClr val="tx1"/>
+              </a:solidFill>
+            </a:endParaRPr>
+          </a:p>
+          <a:p>
+            <a:pPr marL="457200" indent="-457200">
+              <a:buFont typeface="Arial"/>
+              <a:buAutoNum type="arabicPeriod"/>
+            </a:pPr>
+            <a:r>
+              <a:rPr lang="en-US" sz="2000" cap="none" dirty="0" smtClean="0">
+                <a:solidFill>
+                  <a:schemeClr val="tx1"/>
+                </a:solidFill>
+              </a:rPr>
+              <a:t>“Legal </a:t>
+            </a:r>
+            <a:r>
+              <a:rPr lang="en-US" sz="2000" cap="none" dirty="0">
+                <a:solidFill>
+                  <a:schemeClr val="tx1"/>
+                </a:solidFill>
+              </a:rPr>
+              <a:t>and Ethics Issues - Security Power Tools [Book</a:t>
+            </a:r>
+            <a:r>
+              <a:rPr lang="en-US" sz="2000" cap="none" dirty="0" smtClean="0">
+                <a:solidFill>
+                  <a:schemeClr val="tx1"/>
+                </a:solidFill>
+              </a:rPr>
+              <a:t>],”</a:t>
+            </a:r>
+          </a:p>
+          <a:p>
+            <a:pPr marL="457200" indent="-457200">
+              <a:buFont typeface="Arial"/>
+              <a:buAutoNum type="arabicPeriod"/>
+            </a:pPr>
+            <a:r>
+              <a:rPr lang="en-US" sz="2000" cap="none" dirty="0" smtClean="0">
+                <a:solidFill>
+                  <a:schemeClr val="tx1"/>
+                </a:solidFill>
+              </a:rPr>
+              <a:t>“Michael </a:t>
+            </a:r>
+            <a:r>
+              <a:rPr lang="en-US" sz="2000" cap="none" dirty="0">
+                <a:solidFill>
+                  <a:schemeClr val="tx1"/>
+                </a:solidFill>
+              </a:rPr>
+              <a:t>Lynn and Cisco: Stepping in front of the freight train </a:t>
+            </a:r>
+            <a:r>
+              <a:rPr lang="en-US" sz="2000" cap="none" dirty="0" smtClean="0">
+                <a:solidFill>
+                  <a:schemeClr val="tx1"/>
+                </a:solidFill>
+              </a:rPr>
+              <a:t>| Network </a:t>
+            </a:r>
+            <a:r>
+              <a:rPr lang="en-US" sz="2000" cap="none" dirty="0">
+                <a:solidFill>
+                  <a:schemeClr val="tx1"/>
+                </a:solidFill>
+              </a:rPr>
+              <a:t>World.” [Online]. </a:t>
+            </a:r>
+            <a:r>
+              <a:rPr lang="en-US" sz="2000" cap="none" dirty="0" smtClean="0">
+                <a:solidFill>
+                  <a:schemeClr val="tx1"/>
+                </a:solidFill>
+              </a:rPr>
+              <a:t>Available: https</a:t>
+            </a:r>
+            <a:r>
+              <a:rPr lang="en-US" sz="2000" cap="none" dirty="0">
+                <a:solidFill>
+                  <a:schemeClr val="tx1"/>
+                </a:solidFill>
+              </a:rPr>
+              <a:t>://</a:t>
+            </a:r>
+            <a:r>
+              <a:rPr lang="en-US" sz="2000" cap="none" dirty="0" err="1">
+                <a:solidFill>
+                  <a:schemeClr val="tx1"/>
+                </a:solidFill>
+              </a:rPr>
+              <a:t>www.networkworld.com</a:t>
+            </a:r>
+            <a:r>
+              <a:rPr lang="en-US" sz="2000" cap="none" dirty="0">
+                <a:solidFill>
+                  <a:schemeClr val="tx1"/>
+                </a:solidFill>
+              </a:rPr>
+              <a:t>/article/2312972/</a:t>
+            </a:r>
+            <a:r>
+              <a:rPr lang="en-US" sz="2000" cap="none" dirty="0" err="1">
+                <a:solidFill>
+                  <a:schemeClr val="tx1"/>
+                </a:solidFill>
+              </a:rPr>
+              <a:t>lan</a:t>
+            </a:r>
+            <a:r>
+              <a:rPr lang="en-US" sz="2000" cap="none" dirty="0">
+                <a:solidFill>
+                  <a:schemeClr val="tx1"/>
+                </a:solidFill>
+              </a:rPr>
+              <a:t>-wan/</a:t>
+            </a:r>
+            <a:r>
+              <a:rPr lang="en-US" sz="2000" cap="none" dirty="0" err="1">
+                <a:solidFill>
+                  <a:schemeClr val="tx1"/>
+                </a:solidFill>
+              </a:rPr>
+              <a:t>michael</a:t>
+            </a:r>
+            <a:r>
+              <a:rPr lang="en-US" sz="2000" cap="none" dirty="0">
+                <a:solidFill>
+                  <a:schemeClr val="tx1"/>
+                </a:solidFill>
+              </a:rPr>
+              <a:t>-</a:t>
+            </a:r>
+            <a:r>
+              <a:rPr lang="en-US" sz="2000" cap="none" dirty="0" err="1">
+                <a:solidFill>
+                  <a:schemeClr val="tx1"/>
+                </a:solidFill>
+              </a:rPr>
+              <a:t>lynn</a:t>
+            </a:r>
+            <a:r>
+              <a:rPr lang="en-US" sz="2000" cap="none" dirty="0">
+                <a:solidFill>
+                  <a:schemeClr val="tx1"/>
+                </a:solidFill>
+              </a:rPr>
+              <a:t>-and-cisco--stepping-in-front-of-the-freight-</a:t>
+            </a:r>
+            <a:r>
+              <a:rPr lang="en-US" sz="2000" cap="none" dirty="0" err="1">
+                <a:solidFill>
+                  <a:schemeClr val="tx1"/>
+                </a:solidFill>
+              </a:rPr>
+              <a:t>train.html</a:t>
+            </a:r>
+            <a:r>
+              <a:rPr lang="en-US" sz="2000" cap="none" dirty="0">
+                <a:solidFill>
+                  <a:schemeClr val="tx1"/>
+                </a:solidFill>
+              </a:rPr>
+              <a:t>. [Accessed: 07-Apr-2018</a:t>
+            </a:r>
+            <a:r>
+              <a:rPr lang="en-US" sz="2000" cap="none" dirty="0" smtClean="0">
+                <a:solidFill>
+                  <a:schemeClr val="tx1"/>
+                </a:solidFill>
+              </a:rPr>
+              <a:t>].</a:t>
+            </a:r>
+          </a:p>
+          <a:p>
+            <a:pPr marL="457200" indent="-457200">
+              <a:buClr>
+                <a:schemeClr val="tx1"/>
+              </a:buClr>
+              <a:buFont typeface="Arial"/>
+              <a:buAutoNum type="arabicPeriod"/>
+            </a:pPr>
+            <a:r>
+              <a:rPr lang="en-US" sz="2000" cap="none" dirty="0" smtClean="0">
+                <a:solidFill>
+                  <a:schemeClr val="tx1"/>
+                </a:solidFill>
+              </a:rPr>
+              <a:t>“Settlement </a:t>
+            </a:r>
+            <a:r>
+              <a:rPr lang="en-US" sz="2000" cap="none" dirty="0">
+                <a:solidFill>
+                  <a:schemeClr val="tx1"/>
+                </a:solidFill>
+              </a:rPr>
+              <a:t>reached in Cisco flaw dispute • The Register.” [Online]. </a:t>
+            </a:r>
+            <a:r>
+              <a:rPr lang="en-US" sz="2000" cap="none" dirty="0" err="1" smtClean="0">
+                <a:solidFill>
+                  <a:schemeClr val="tx1"/>
+                </a:solidFill>
+              </a:rPr>
+              <a:t>Available:https</a:t>
+            </a:r>
+            <a:r>
+              <a:rPr lang="en-US" sz="2000" cap="none" dirty="0">
+                <a:solidFill>
+                  <a:schemeClr val="tx1"/>
+                </a:solidFill>
+              </a:rPr>
+              <a:t>://</a:t>
+            </a:r>
+            <a:r>
+              <a:rPr lang="en-US" sz="2000" cap="none" dirty="0" err="1">
+                <a:solidFill>
+                  <a:schemeClr val="tx1"/>
+                </a:solidFill>
+              </a:rPr>
+              <a:t>www.theregister.co.uk</a:t>
+            </a:r>
+            <a:r>
+              <a:rPr lang="en-US" sz="2000" cap="none" dirty="0">
+                <a:solidFill>
+                  <a:schemeClr val="tx1"/>
+                </a:solidFill>
+              </a:rPr>
+              <a:t>/2005/07/29/</a:t>
+            </a:r>
+            <a:r>
+              <a:rPr lang="en-US" sz="2000" cap="none" dirty="0" err="1">
+                <a:solidFill>
+                  <a:schemeClr val="tx1"/>
+                </a:solidFill>
+              </a:rPr>
+              <a:t>cisco_settles_rogue_researcher_dispute</a:t>
+            </a:r>
+            <a:r>
+              <a:rPr lang="en-US" sz="2000" cap="none" dirty="0">
+                <a:solidFill>
+                  <a:schemeClr val="tx1"/>
+                </a:solidFill>
+              </a:rPr>
+              <a:t>/. [Accessed: 07-Apr-2018</a:t>
+            </a:r>
+            <a:r>
+              <a:rPr lang="en-US" sz="2000" cap="none" dirty="0" smtClean="0">
+                <a:solidFill>
+                  <a:schemeClr val="tx1"/>
+                </a:solidFill>
+              </a:rPr>
+              <a:t>].</a:t>
+            </a:r>
+          </a:p>
+          <a:p>
+            <a:pPr marL="457200" indent="-457200">
+              <a:buClr>
+                <a:schemeClr val="tx1"/>
+              </a:buClr>
+              <a:buFont typeface="Arial"/>
+              <a:buAutoNum type="arabicPeriod"/>
+            </a:pPr>
+            <a:r>
+              <a:rPr lang="en-US" sz="2000" cap="none" dirty="0" err="1">
+                <a:solidFill>
+                  <a:schemeClr val="tx1"/>
+                </a:solidFill>
+              </a:rPr>
+              <a:t>Cryptome.org</a:t>
+            </a:r>
+            <a:r>
+              <a:rPr lang="en-US" sz="2000" cap="none" dirty="0">
+                <a:solidFill>
+                  <a:schemeClr val="tx1"/>
+                </a:solidFill>
+              </a:rPr>
+              <a:t>. (2018). [online] Available at: </a:t>
+            </a:r>
+            <a:r>
+              <a:rPr lang="en-US" sz="2000" cap="none" dirty="0">
+                <a:solidFill>
+                  <a:schemeClr val="tx1"/>
+                </a:solidFill>
+                <a:hlinkClick r:id="rId3"/>
+              </a:rPr>
+              <a:t>http://cryptome.org/lynn-cisco.pdf</a:t>
+            </a:r>
+            <a:r>
+              <a:rPr lang="en-US" sz="2000" cap="none" dirty="0">
+                <a:solidFill>
+                  <a:schemeClr val="tx1"/>
+                </a:solidFill>
+              </a:rPr>
+              <a:t> [Accessed 7 Apr. 2018].</a:t>
+            </a:r>
+            <a:endParaRPr lang="en-US" sz="1200" cap="none" dirty="0">
+              <a:solidFill>
+                <a:schemeClr val="tx1"/>
+              </a:solidFill>
+            </a:endParaRPr>
           </a:p>
           <a:p>
             <a:pPr marL="457200" lvl="0" indent="-457200">
@@ -9392,6 +9936,16 @@
               </a:solidFill>
             </a:endParaRPr>
           </a:p>
+          <a:p>
+            <a:pPr marL="457200" lvl="0" indent="-457200">
+              <a:buAutoNum type="arabicPeriod"/>
+            </a:pPr>
+            <a:endParaRPr lang="en-US" cap="none" dirty="0">
+              <a:solidFill>
+                <a:schemeClr val="tx1"/>
+              </a:solidFill>
+            </a:endParaRPr>
+          </a:p>
         </p:txBody>
       </p:sp>
     </p:spTree>
@@ -9400,6 +9954,13 @@
     <a:masterClrMapping/>
   </p:clrMapOvr>
   <p:transition spd="med"/>
+  <p:timing>
+    <p:tnLst>
+      <p:par>
+        <p:cTn id="1" dur="indefinite" restart="never" nodeType="tmRoot"/>
+      </p:par>
+    </p:tnLst>
+  </p:timing>
 </p:sld>
 </file>
 

</xml_diff>